<commit_message>
bridge update and ACT day 1
</commit_message>
<xml_diff>
--- a/_PowerPoints/2nd Semester/Unit 8 Bridge Building/PreCalc_Day_059 Bridge Day 4 (Last Build Day).pptx
+++ b/_PowerPoints/2nd Semester/Unit 8 Bridge Building/PreCalc_Day_059 Bridge Day 4 (Last Build Day).pptx
@@ -208,7 +208,7 @@
           <a:p>
             <a:fld id="{FAC4242D-6570-4D26-878C-5DE8AD62D39F}" type="datetimeFigureOut">
               <a:rPr lang="en-US" smtClean="0"/>
-              <a:t>3/6/2018</a:t>
+              <a:t>3/7/2018</a:t>
             </a:fld>
             <a:endParaRPr lang="en-US"/>
           </a:p>
@@ -461,7 +461,7 @@
             <a:fld id="{87DE6118-2437-4B30-8E3C-4D2BE6020583}" type="datetimeFigureOut">
               <a:rPr lang="en-US" dirty="0"/>
               <a:pPr/>
-              <a:t>3/6/2018</a:t>
+              <a:t>3/7/2018</a:t>
             </a:fld>
             <a:endParaRPr lang="en-US" dirty="0"/>
           </a:p>
@@ -787,7 +787,7 @@
           <a:p>
             <a:fld id="{87DE6118-2437-4B30-8E3C-4D2BE6020583}" type="datetimeFigureOut">
               <a:rPr lang="en-US" dirty="0"/>
-              <a:t>3/6/2018</a:t>
+              <a:t>3/7/2018</a:t>
             </a:fld>
             <a:endParaRPr lang="en-US" dirty="0"/>
           </a:p>
@@ -962,7 +962,7 @@
           <a:p>
             <a:fld id="{87DE6118-2437-4B30-8E3C-4D2BE6020583}" type="datetimeFigureOut">
               <a:rPr lang="en-US" dirty="0"/>
-              <a:t>3/6/2018</a:t>
+              <a:t>3/7/2018</a:t>
             </a:fld>
             <a:endParaRPr lang="en-US" dirty="0"/>
           </a:p>
@@ -1127,7 +1127,7 @@
           <a:p>
             <a:fld id="{87DE6118-2437-4B30-8E3C-4D2BE6020583}" type="datetimeFigureOut">
               <a:rPr lang="en-US" dirty="0"/>
-              <a:t>3/6/2018</a:t>
+              <a:t>3/7/2018</a:t>
             </a:fld>
             <a:endParaRPr lang="en-US" dirty="0"/>
           </a:p>
@@ -1400,7 +1400,7 @@
             <a:fld id="{87DE6118-2437-4B30-8E3C-4D2BE6020583}" type="datetimeFigureOut">
               <a:rPr lang="en-US" dirty="0"/>
               <a:pPr/>
-              <a:t>3/6/2018</a:t>
+              <a:t>3/7/2018</a:t>
             </a:fld>
             <a:endParaRPr lang="en-US" dirty="0"/>
           </a:p>
@@ -1790,7 +1790,7 @@
           <a:p>
             <a:fld id="{87DE6118-2437-4B30-8E3C-4D2BE6020583}" type="datetimeFigureOut">
               <a:rPr lang="en-US" dirty="0"/>
-              <a:t>3/6/2018</a:t>
+              <a:t>3/7/2018</a:t>
             </a:fld>
             <a:endParaRPr lang="en-US" dirty="0"/>
           </a:p>
@@ -2262,7 +2262,7 @@
           <a:p>
             <a:fld id="{87DE6118-2437-4B30-8E3C-4D2BE6020583}" type="datetimeFigureOut">
               <a:rPr lang="en-US" dirty="0"/>
-              <a:t>3/6/2018</a:t>
+              <a:t>3/7/2018</a:t>
             </a:fld>
             <a:endParaRPr lang="en-US" dirty="0"/>
           </a:p>
@@ -2375,7 +2375,7 @@
           <a:p>
             <a:fld id="{87DE6118-2437-4B30-8E3C-4D2BE6020583}" type="datetimeFigureOut">
               <a:rPr lang="en-US" dirty="0"/>
-              <a:t>3/6/2018</a:t>
+              <a:t>3/7/2018</a:t>
             </a:fld>
             <a:endParaRPr lang="en-US" dirty="0"/>
           </a:p>
@@ -2465,7 +2465,7 @@
           <a:p>
             <a:fld id="{87DE6118-2437-4B30-8E3C-4D2BE6020583}" type="datetimeFigureOut">
               <a:rPr lang="en-US" dirty="0"/>
-              <a:t>3/6/2018</a:t>
+              <a:t>3/7/2018</a:t>
             </a:fld>
             <a:endParaRPr lang="en-US" dirty="0"/>
           </a:p>
@@ -2807,7 +2807,7 @@
             <a:fld id="{87DE6118-2437-4B30-8E3C-4D2BE6020583}" type="datetimeFigureOut">
               <a:rPr lang="en-US" dirty="0"/>
               <a:pPr/>
-              <a:t>3/6/2018</a:t>
+              <a:t>3/7/2018</a:t>
             </a:fld>
             <a:endParaRPr lang="en-US" dirty="0"/>
           </a:p>
@@ -3192,7 +3192,7 @@
             <a:fld id="{87DE6118-2437-4B30-8E3C-4D2BE6020583}" type="datetimeFigureOut">
               <a:rPr lang="en-US" dirty="0"/>
               <a:pPr/>
-              <a:t>3/6/2018</a:t>
+              <a:t>3/7/2018</a:t>
             </a:fld>
             <a:endParaRPr lang="en-US" dirty="0"/>
           </a:p>
@@ -3467,7 +3467,7 @@
             <a:fld id="{87DE6118-2437-4B30-8E3C-4D2BE6020583}" type="datetimeFigureOut">
               <a:rPr lang="en-US" dirty="0"/>
               <a:pPr/>
-              <a:t>3/6/2018</a:t>
+              <a:t>3/7/2018</a:t>
             </a:fld>
             <a:endParaRPr lang="en-US" dirty="0"/>
           </a:p>
@@ -4023,11 +4023,7 @@
           <a:p>
             <a:r>
               <a:rPr lang="en-US" smtClean="0"/>
-              <a:t>Day </a:t>
-            </a:r>
-            <a:r>
-              <a:rPr lang="en-US" smtClean="0"/>
-              <a:t>59</a:t>
+              <a:t>Day 59</a:t>
             </a:r>
             <a:endParaRPr lang="en-US" dirty="0"/>
           </a:p>
@@ -4705,8 +4701,21 @@
           <a:p>
             <a:r>
               <a:rPr lang="en-US" dirty="0" smtClean="0"/>
-              <a:t>Ideally we are testing bridges at end of this class, but if we have to push it back a day we can. </a:t>
-            </a:r>
+              <a:t>Potentially testing </a:t>
+            </a:r>
+            <a:r>
+              <a:rPr lang="en-US" dirty="0" smtClean="0"/>
+              <a:t>bridges at end of this class, but if </a:t>
+            </a:r>
+            <a:r>
+              <a:rPr lang="en-US" dirty="0" smtClean="0"/>
+              <a:t>more than likely will happen </a:t>
+            </a:r>
+            <a:r>
+              <a:rPr lang="en-US" smtClean="0"/>
+              <a:t>next time. </a:t>
+            </a:r>
+            <a:endParaRPr lang="en-US" dirty="0" smtClean="0"/>
           </a:p>
         </p:txBody>
       </p:sp>

</xml_diff>